<commit_message>
Update Course1 powerpoint and code.
</commit_message>
<xml_diff>
--- a/3. Keyword.pptx
+++ b/3. Keyword.pptx
@@ -118,14 +118,6 @@
 </p:presentation>
 </file>
 
-<file path=ppt/revisionInfo.xml><?xml version="1.0" encoding="utf-8"?>
-<p1510:revInfo xmlns:a="http://schemas.openxmlformats.org/drawingml/2006/main" xmlns:r="http://schemas.openxmlformats.org/officeDocument/2006/relationships" xmlns:p1510="http://schemas.microsoft.com/office/powerpoint/2015/10/main">
-  <p1510:revLst>
-    <p1510:client id="{5F21D7F0-93DA-4727-B905-B15F85D7E0F3}" v="1258" dt="2021-05-05T21:11:22.476"/>
-  </p1510:revLst>
-</p1510:revInfo>
-</file>
-
 <file path=ppt/changesInfos/changesInfo1.xml><?xml version="1.0" encoding="utf-8"?>
 <pc:chgInfo xmlns:a="http://schemas.openxmlformats.org/drawingml/2006/main" xmlns:r="http://schemas.openxmlformats.org/officeDocument/2006/relationships" xmlns:ac="http://schemas.microsoft.com/office/drawing/2013/main/command" xmlns:pc="http://schemas.microsoft.com/office/powerpoint/2013/main/command">
   <pc:docChgLst>
@@ -178,6 +170,38 @@
             <pc:docMk/>
             <pc:sldMk cId="1303491138" sldId="257"/>
             <ac:spMk id="4" creationId="{18E1A2DA-6E0B-447A-9524-59F4932D6306}"/>
+          </ac:spMkLst>
+        </pc:spChg>
+      </pc:sldChg>
+    </pc:docChg>
+  </pc:docChgLst>
+  <pc:docChgLst>
+    <pc:chgData name="Felix Theroux" userId="542abe99-8cd3-45d7-bac7-857c7b176da4" providerId="ADAL" clId="{87976667-B5D7-4984-91B5-93C404F6D1D3}"/>
+    <pc:docChg chg="custSel modSld">
+      <pc:chgData name="Felix Theroux" userId="542abe99-8cd3-45d7-bac7-857c7b176da4" providerId="ADAL" clId="{87976667-B5D7-4984-91B5-93C404F6D1D3}" dt="2022-01-20T20:42:17.509" v="692" actId="20577"/>
+      <pc:docMkLst>
+        <pc:docMk/>
+      </pc:docMkLst>
+      <pc:sldChg chg="modSp mod">
+        <pc:chgData name="Felix Theroux" userId="542abe99-8cd3-45d7-bac7-857c7b176da4" providerId="ADAL" clId="{87976667-B5D7-4984-91B5-93C404F6D1D3}" dt="2022-01-20T20:42:17.509" v="692" actId="20577"/>
+        <pc:sldMkLst>
+          <pc:docMk/>
+          <pc:sldMk cId="2805983188" sldId="261"/>
+        </pc:sldMkLst>
+        <pc:spChg chg="mod">
+          <ac:chgData name="Felix Theroux" userId="542abe99-8cd3-45d7-bac7-857c7b176da4" providerId="ADAL" clId="{87976667-B5D7-4984-91B5-93C404F6D1D3}" dt="2022-01-20T20:42:17.509" v="692" actId="20577"/>
+          <ac:spMkLst>
+            <pc:docMk/>
+            <pc:sldMk cId="2805983188" sldId="261"/>
+            <ac:spMk id="14" creationId="{F89B6697-E65C-4E5E-86AC-6F84D080A021}"/>
+          </ac:spMkLst>
+        </pc:spChg>
+        <pc:spChg chg="mod">
+          <ac:chgData name="Felix Theroux" userId="542abe99-8cd3-45d7-bac7-857c7b176da4" providerId="ADAL" clId="{87976667-B5D7-4984-91B5-93C404F6D1D3}" dt="2022-01-20T20:41:32.533" v="586" actId="20577"/>
+          <ac:spMkLst>
+            <pc:docMk/>
+            <pc:sldMk cId="2805983188" sldId="261"/>
+            <ac:spMk id="18" creationId="{E6B2F6AF-8889-4430-B2A7-1F6BE6870C7D}"/>
           </ac:spMkLst>
         </pc:spChg>
       </pc:sldChg>
@@ -794,7 +818,7 @@
           <a:p>
             <a:fld id="{49159134-6BFA-466F-80EE-621D8D1B11AD}" type="datetimeFigureOut">
               <a:rPr lang="en-US" smtClean="0"/>
-              <a:t>5/25/2021</a:t>
+              <a:t>1/20/2022</a:t>
             </a:fld>
             <a:endParaRPr lang="en-US"/>
           </a:p>
@@ -1469,7 +1493,7 @@
           <a:p>
             <a:fld id="{B10414CF-42F2-45D9-A54B-37400E893814}" type="datetimeFigureOut">
               <a:rPr lang="en-US" smtClean="0"/>
-              <a:t>5/25/2021</a:t>
+              <a:t>1/20/2022</a:t>
             </a:fld>
             <a:endParaRPr lang="en-US"/>
           </a:p>
@@ -1667,7 +1691,7 @@
           <a:p>
             <a:fld id="{B10414CF-42F2-45D9-A54B-37400E893814}" type="datetimeFigureOut">
               <a:rPr lang="en-US" smtClean="0"/>
-              <a:t>5/25/2021</a:t>
+              <a:t>1/20/2022</a:t>
             </a:fld>
             <a:endParaRPr lang="en-US"/>
           </a:p>
@@ -1875,7 +1899,7 @@
           <a:p>
             <a:fld id="{B10414CF-42F2-45D9-A54B-37400E893814}" type="datetimeFigureOut">
               <a:rPr lang="en-US" smtClean="0"/>
-              <a:t>5/25/2021</a:t>
+              <a:t>1/20/2022</a:t>
             </a:fld>
             <a:endParaRPr lang="en-US"/>
           </a:p>
@@ -2073,7 +2097,7 @@
           <a:p>
             <a:fld id="{B10414CF-42F2-45D9-A54B-37400E893814}" type="datetimeFigureOut">
               <a:rPr lang="en-US" smtClean="0"/>
-              <a:t>5/25/2021</a:t>
+              <a:t>1/20/2022</a:t>
             </a:fld>
             <a:endParaRPr lang="en-US"/>
           </a:p>
@@ -2348,7 +2372,7 @@
           <a:p>
             <a:fld id="{B10414CF-42F2-45D9-A54B-37400E893814}" type="datetimeFigureOut">
               <a:rPr lang="en-US" smtClean="0"/>
-              <a:t>5/25/2021</a:t>
+              <a:t>1/20/2022</a:t>
             </a:fld>
             <a:endParaRPr lang="en-US"/>
           </a:p>
@@ -2613,7 +2637,7 @@
           <a:p>
             <a:fld id="{B10414CF-42F2-45D9-A54B-37400E893814}" type="datetimeFigureOut">
               <a:rPr lang="en-US" smtClean="0"/>
-              <a:t>5/25/2021</a:t>
+              <a:t>1/20/2022</a:t>
             </a:fld>
             <a:endParaRPr lang="en-US"/>
           </a:p>
@@ -3025,7 +3049,7 @@
           <a:p>
             <a:fld id="{B10414CF-42F2-45D9-A54B-37400E893814}" type="datetimeFigureOut">
               <a:rPr lang="en-US" smtClean="0"/>
-              <a:t>5/25/2021</a:t>
+              <a:t>1/20/2022</a:t>
             </a:fld>
             <a:endParaRPr lang="en-US"/>
           </a:p>
@@ -3166,7 +3190,7 @@
           <a:p>
             <a:fld id="{B10414CF-42F2-45D9-A54B-37400E893814}" type="datetimeFigureOut">
               <a:rPr lang="en-US" smtClean="0"/>
-              <a:t>5/25/2021</a:t>
+              <a:t>1/20/2022</a:t>
             </a:fld>
             <a:endParaRPr lang="en-US"/>
           </a:p>
@@ -3279,7 +3303,7 @@
           <a:p>
             <a:fld id="{B10414CF-42F2-45D9-A54B-37400E893814}" type="datetimeFigureOut">
               <a:rPr lang="en-US" smtClean="0"/>
-              <a:t>5/25/2021</a:t>
+              <a:t>1/20/2022</a:t>
             </a:fld>
             <a:endParaRPr lang="en-US"/>
           </a:p>
@@ -3590,7 +3614,7 @@
           <a:p>
             <a:fld id="{B10414CF-42F2-45D9-A54B-37400E893814}" type="datetimeFigureOut">
               <a:rPr lang="en-US" smtClean="0"/>
-              <a:t>5/25/2021</a:t>
+              <a:t>1/20/2022</a:t>
             </a:fld>
             <a:endParaRPr lang="en-US"/>
           </a:p>
@@ -3878,7 +3902,7 @@
           <a:p>
             <a:fld id="{B10414CF-42F2-45D9-A54B-37400E893814}" type="datetimeFigureOut">
               <a:rPr lang="en-US" smtClean="0"/>
-              <a:t>5/25/2021</a:t>
+              <a:t>1/20/2022</a:t>
             </a:fld>
             <a:endParaRPr lang="en-US"/>
           </a:p>
@@ -4119,7 +4143,7 @@
           <a:p>
             <a:fld id="{B10414CF-42F2-45D9-A54B-37400E893814}" type="datetimeFigureOut">
               <a:rPr lang="en-US" smtClean="0"/>
-              <a:t>5/25/2021</a:t>
+              <a:t>1/20/2022</a:t>
             </a:fld>
             <a:endParaRPr lang="en-US"/>
           </a:p>
@@ -9443,7 +9467,7 @@
           <a:p>
             <a:r>
               <a:rPr lang="en-US" sz="1600" dirty="0"/>
-              <a:t>Virtual</a:t>
+              <a:t>Virtual/override</a:t>
             </a:r>
           </a:p>
           <a:p>
@@ -9454,6 +9478,20 @@
             </a:r>
           </a:p>
           <a:p>
+            <a:pPr lvl="1"/>
+            <a:r>
+              <a:rPr lang="en-US" sz="1200" kern="0" dirty="0"/>
+              <a:t>Virtual need to be added to the function in root class</a:t>
+            </a:r>
+          </a:p>
+          <a:p>
+            <a:pPr lvl="1"/>
+            <a:r>
+              <a:rPr lang="en-US" sz="1200" kern="0" dirty="0"/>
+              <a:t>Any children waiting to change the behavior need to redefine the function/property but adding the override keyword in the declaration</a:t>
+            </a:r>
+          </a:p>
+          <a:p>
             <a:r>
               <a:rPr lang="en-US" sz="1600" kern="0" dirty="0"/>
               <a:t>base </a:t>
@@ -9470,7 +9508,7 @@
             <a:pPr lvl="1"/>
             <a:r>
               <a:rPr lang="en-US" sz="1200" kern="0" dirty="0"/>
-              <a:t>Useful if we override a function in a children class to add logic before or after base class logic will run.</a:t>
+              <a:t>Useful if we want to override a function in a children class but still use the logic of the base class.</a:t>
             </a:r>
           </a:p>
           <a:p>
@@ -9490,7 +9528,7 @@
             <a:pPr lvl="1"/>
             <a:r>
               <a:rPr lang="en-US" sz="1200" kern="0" dirty="0"/>
-              <a:t>Function : Do not allow to be overridden by a child class. But can be used in an abstract class without issue (just not on the class itself).</a:t>
+              <a:t>Function : Do not allow to be overridden by a child class. But can be used in an abstract class without issue (just not on the class itself or on an abstract method).</a:t>
             </a:r>
           </a:p>
           <a:p>
@@ -9542,7 +9580,7 @@
         </p:spPr>
         <p:txBody>
           <a:bodyPr vert="horz" lIns="91440" tIns="45720" rIns="91440" bIns="45720" rtlCol="0">
-            <a:normAutofit/>
+            <a:normAutofit lnSpcReduction="10000"/>
           </a:bodyPr>
           <a:lstStyle>
             <a:lvl1pPr marL="0" indent="0" algn="l" defTabSz="914400" rtl="0" eaLnBrk="1" latinLnBrk="0" hangingPunct="1">
@@ -9759,6 +9797,16 @@
             </a:r>
           </a:p>
           <a:p>
+            <a:pPr marL="1200150" lvl="2" indent="-285750">
+              <a:buFont typeface="Arial" panose="020B0604020202020204" pitchFamily="34" charset="0"/>
+              <a:buChar char="•"/>
+            </a:pPr>
+            <a:r>
+              <a:rPr lang="en-US" dirty="0"/>
+              <a:t>Better splitting up the class</a:t>
+            </a:r>
+          </a:p>
+          <a:p>
             <a:pPr marL="285750" indent="-285750">
               <a:buFont typeface="Arial" panose="020B0604020202020204" pitchFamily="34" charset="0"/>
               <a:buChar char="•"/>
@@ -9787,6 +9835,21 @@
               <a:rPr lang="en-US" dirty="0"/>
               <a:t>Functions and properties : Force the children class(es) to implement the logic of the function/properties </a:t>
             </a:r>
+          </a:p>
+          <a:p>
+            <a:pPr marL="742950" lvl="1" indent="-285750">
+              <a:buFont typeface="Arial" panose="020B0604020202020204" pitchFamily="34" charset="0"/>
+              <a:buChar char="•"/>
+            </a:pPr>
+            <a:r>
+              <a:rPr lang="en-US" dirty="0"/>
+              <a:t>Still allow to implement base functionality and properties used by the </a:t>
+            </a:r>
+            <a:r>
+              <a:rPr lang="en-US"/>
+              <a:t>children class.</a:t>
+            </a:r>
+            <a:endParaRPr lang="en-US" dirty="0"/>
           </a:p>
         </p:txBody>
       </p:sp>

</xml_diff>